<commit_message>
adding model, refactor files
</commit_message>
<xml_diff>
--- a/Workplan for project/schets situatie.pptx
+++ b/Workplan for project/schets situatie.pptx
@@ -110,6 +110,11 @@
       </a:defRPr>
     </a:lvl9pPr>
   </p:defaultTextStyle>
+  <p:extLst>
+    <p:ext uri="{EFAFB233-063F-42B5-8137-9DF3F51BA10A}">
+      <p15:sldGuideLst xmlns:p15="http://schemas.microsoft.com/office/powerpoint/2012/main"/>
+    </p:ext>
+  </p:extLst>
 </p:presentation>
 </file>
 
@@ -262,7 +267,7 @@
           <a:p>
             <a:fld id="{74C2A7DE-DD20-4600-BA6D-0213E0EB52CA}" type="datetimeFigureOut">
               <a:rPr lang="en-NL" smtClean="0"/>
-              <a:t>13/12/2023</a:t>
+              <a:t>21/12/2023</a:t>
             </a:fld>
             <a:endParaRPr lang="en-NL"/>
           </a:p>
@@ -462,7 +467,7 @@
           <a:p>
             <a:fld id="{74C2A7DE-DD20-4600-BA6D-0213E0EB52CA}" type="datetimeFigureOut">
               <a:rPr lang="en-NL" smtClean="0"/>
-              <a:t>13/12/2023</a:t>
+              <a:t>21/12/2023</a:t>
             </a:fld>
             <a:endParaRPr lang="en-NL"/>
           </a:p>
@@ -672,7 +677,7 @@
           <a:p>
             <a:fld id="{74C2A7DE-DD20-4600-BA6D-0213E0EB52CA}" type="datetimeFigureOut">
               <a:rPr lang="en-NL" smtClean="0"/>
-              <a:t>13/12/2023</a:t>
+              <a:t>21/12/2023</a:t>
             </a:fld>
             <a:endParaRPr lang="en-NL"/>
           </a:p>
@@ -872,7 +877,7 @@
           <a:p>
             <a:fld id="{74C2A7DE-DD20-4600-BA6D-0213E0EB52CA}" type="datetimeFigureOut">
               <a:rPr lang="en-NL" smtClean="0"/>
-              <a:t>13/12/2023</a:t>
+              <a:t>21/12/2023</a:t>
             </a:fld>
             <a:endParaRPr lang="en-NL"/>
           </a:p>
@@ -1148,7 +1153,7 @@
           <a:p>
             <a:fld id="{74C2A7DE-DD20-4600-BA6D-0213E0EB52CA}" type="datetimeFigureOut">
               <a:rPr lang="en-NL" smtClean="0"/>
-              <a:t>13/12/2023</a:t>
+              <a:t>21/12/2023</a:t>
             </a:fld>
             <a:endParaRPr lang="en-NL"/>
           </a:p>
@@ -1416,7 +1421,7 @@
           <a:p>
             <a:fld id="{74C2A7DE-DD20-4600-BA6D-0213E0EB52CA}" type="datetimeFigureOut">
               <a:rPr lang="en-NL" smtClean="0"/>
-              <a:t>13/12/2023</a:t>
+              <a:t>21/12/2023</a:t>
             </a:fld>
             <a:endParaRPr lang="en-NL"/>
           </a:p>
@@ -1831,7 +1836,7 @@
           <a:p>
             <a:fld id="{74C2A7DE-DD20-4600-BA6D-0213E0EB52CA}" type="datetimeFigureOut">
               <a:rPr lang="en-NL" smtClean="0"/>
-              <a:t>13/12/2023</a:t>
+              <a:t>21/12/2023</a:t>
             </a:fld>
             <a:endParaRPr lang="en-NL"/>
           </a:p>
@@ -1973,7 +1978,7 @@
           <a:p>
             <a:fld id="{74C2A7DE-DD20-4600-BA6D-0213E0EB52CA}" type="datetimeFigureOut">
               <a:rPr lang="en-NL" smtClean="0"/>
-              <a:t>13/12/2023</a:t>
+              <a:t>21/12/2023</a:t>
             </a:fld>
             <a:endParaRPr lang="en-NL"/>
           </a:p>
@@ -2086,7 +2091,7 @@
           <a:p>
             <a:fld id="{74C2A7DE-DD20-4600-BA6D-0213E0EB52CA}" type="datetimeFigureOut">
               <a:rPr lang="en-NL" smtClean="0"/>
-              <a:t>13/12/2023</a:t>
+              <a:t>21/12/2023</a:t>
             </a:fld>
             <a:endParaRPr lang="en-NL"/>
           </a:p>
@@ -2399,7 +2404,7 @@
           <a:p>
             <a:fld id="{74C2A7DE-DD20-4600-BA6D-0213E0EB52CA}" type="datetimeFigureOut">
               <a:rPr lang="en-NL" smtClean="0"/>
-              <a:t>13/12/2023</a:t>
+              <a:t>21/12/2023</a:t>
             </a:fld>
             <a:endParaRPr lang="en-NL"/>
           </a:p>
@@ -2688,7 +2693,7 @@
           <a:p>
             <a:fld id="{74C2A7DE-DD20-4600-BA6D-0213E0EB52CA}" type="datetimeFigureOut">
               <a:rPr lang="en-NL" smtClean="0"/>
-              <a:t>13/12/2023</a:t>
+              <a:t>21/12/2023</a:t>
             </a:fld>
             <a:endParaRPr lang="en-NL"/>
           </a:p>
@@ -2931,7 +2936,7 @@
           <a:p>
             <a:fld id="{74C2A7DE-DD20-4600-BA6D-0213E0EB52CA}" type="datetimeFigureOut">
               <a:rPr lang="en-NL" smtClean="0"/>
-              <a:t>13/12/2023</a:t>
+              <a:t>21/12/2023</a:t>
             </a:fld>
             <a:endParaRPr lang="en-NL"/>
           </a:p>
@@ -5158,7 +5163,7 @@
           <a:p>
             <a:pPr lvl="1"/>
             <a:r>
-              <a:rPr lang="en-GB" dirty="0"/>
+              <a:rPr lang="en-GB" strike="sngStrike" dirty="0"/>
               <a:t>Analysis of when water excess</a:t>
             </a:r>
           </a:p>
@@ -5184,7 +5189,7 @@
           </a:p>
           <a:p>
             <a:r>
-              <a:rPr lang="en-GB" dirty="0"/>
+              <a:rPr lang="en-GB" strike="sngStrike" dirty="0"/>
               <a:t>Storage possibly above ground if pumping rate too low</a:t>
             </a:r>
           </a:p>

</xml_diff>